<commit_message>
troca equipe por aluno
</commit_message>
<xml_diff>
--- a/Documentacao Projeto/Modelo de Domínio.pptx
+++ b/Documentacao Projeto/Modelo de Domínio.pptx
@@ -106,7 +106,7 @@
   </p:defaultTextStyle>
   <p:extLst>
     <p:ext uri="{EFAFB233-063F-42B5-8137-9DF3F51BA10A}">
-      <p15:sldGuideLst xmlns:p15="http://schemas.microsoft.com/office/powerpoint/2012/main"/>
+      <p15:sldGuideLst xmlns:p15="http://schemas.microsoft.com/office/powerpoint/2012/main" xmlns=""/>
     </p:ext>
   </p:extLst>
 </p:presentation>
@@ -3145,64 +3145,6 @@
       </p:sp>
       <p:sp>
         <p:nvSpPr>
-          <p:cNvPr id="7" name="Retângulo 6"/>
-          <p:cNvSpPr/>
-          <p:nvPr/>
-        </p:nvSpPr>
-        <p:spPr>
-          <a:xfrm>
-            <a:off x="832937" y="2490135"/>
-            <a:ext cx="1380623" cy="612411"/>
-          </a:xfrm>
-          <a:prstGeom prst="rect">
-            <a:avLst/>
-          </a:prstGeom>
-          <a:noFill/>
-          <a:ln>
-            <a:solidFill>
-              <a:schemeClr val="tx1"/>
-            </a:solidFill>
-          </a:ln>
-        </p:spPr>
-        <p:style>
-          <a:lnRef idx="2">
-            <a:schemeClr val="accent1">
-              <a:shade val="50000"/>
-            </a:schemeClr>
-          </a:lnRef>
-          <a:fillRef idx="1">
-            <a:schemeClr val="accent1"/>
-          </a:fillRef>
-          <a:effectRef idx="0">
-            <a:schemeClr val="accent1"/>
-          </a:effectRef>
-          <a:fontRef idx="minor">
-            <a:schemeClr val="lt1"/>
-          </a:fontRef>
-        </p:style>
-        <p:txBody>
-          <a:bodyPr rot="0" spcFirstLastPara="0" vertOverflow="overflow" horzOverflow="overflow" vert="horz" wrap="square" lIns="91440" tIns="45720" rIns="91440" bIns="45720" numCol="1" spcCol="0" rtlCol="0" fromWordArt="0" anchor="ctr" anchorCtr="0" forceAA="0" compatLnSpc="1">
-            <a:prstTxWarp prst="textNoShape">
-              <a:avLst/>
-            </a:prstTxWarp>
-            <a:noAutofit/>
-          </a:bodyPr>
-          <a:lstStyle/>
-          <a:p>
-            <a:pPr algn="ctr"/>
-            <a:r>
-              <a:rPr lang="pt-BR" dirty="0">
-                <a:solidFill>
-                  <a:schemeClr val="tx1"/>
-                </a:solidFill>
-              </a:rPr>
-              <a:t>Aluno</a:t>
-            </a:r>
-          </a:p>
-        </p:txBody>
-      </p:sp>
-      <p:sp>
-        <p:nvSpPr>
           <p:cNvPr id="8" name="Retângulo 7"/>
           <p:cNvSpPr/>
           <p:nvPr/>
@@ -3749,7 +3691,7 @@
                   <a:schemeClr val="tx1"/>
                 </a:solidFill>
               </a:rPr>
-              <a:t>Equipes</a:t>
+              <a:t>Aluno</a:t>
             </a:r>
             <a:endParaRPr lang="pt-BR" dirty="0">
               <a:solidFill>
@@ -4458,95 +4400,6 @@
           </a:fontRef>
         </p:style>
       </p:cxnSp>
-      <p:cxnSp>
-        <p:nvCxnSpPr>
-          <p:cNvPr id="48" name="Conector reto 47"/>
-          <p:cNvCxnSpPr>
-            <a:stCxn id="52" idx="2"/>
-            <a:endCxn id="7" idx="0"/>
-          </p:cNvCxnSpPr>
-          <p:nvPr/>
-        </p:nvCxnSpPr>
-        <p:spPr>
-          <a:xfrm>
-            <a:off x="1523248" y="2212523"/>
-            <a:ext cx="1" cy="277612"/>
-          </a:xfrm>
-          <a:prstGeom prst="line">
-            <a:avLst/>
-          </a:prstGeom>
-          <a:ln>
-            <a:solidFill>
-              <a:schemeClr val="tx1"/>
-            </a:solidFill>
-          </a:ln>
-        </p:spPr>
-        <p:style>
-          <a:lnRef idx="1">
-            <a:schemeClr val="accent1"/>
-          </a:lnRef>
-          <a:fillRef idx="0">
-            <a:schemeClr val="accent1"/>
-          </a:fillRef>
-          <a:effectRef idx="0">
-            <a:schemeClr val="accent1"/>
-          </a:effectRef>
-          <a:fontRef idx="minor">
-            <a:schemeClr val="tx1"/>
-          </a:fontRef>
-        </p:style>
-      </p:cxnSp>
-      <p:sp>
-        <p:nvSpPr>
-          <p:cNvPr id="52" name="Losango 51"/>
-          <p:cNvSpPr/>
-          <p:nvPr/>
-        </p:nvSpPr>
-        <p:spPr>
-          <a:xfrm>
-            <a:off x="1424511" y="2008609"/>
-            <a:ext cx="197474" cy="203914"/>
-          </a:xfrm>
-          <a:prstGeom prst="diamond">
-            <a:avLst/>
-          </a:prstGeom>
-          <a:noFill/>
-          <a:ln>
-            <a:solidFill>
-              <a:schemeClr val="tx1"/>
-            </a:solidFill>
-          </a:ln>
-        </p:spPr>
-        <p:style>
-          <a:lnRef idx="2">
-            <a:schemeClr val="accent1">
-              <a:shade val="50000"/>
-            </a:schemeClr>
-          </a:lnRef>
-          <a:fillRef idx="1">
-            <a:schemeClr val="accent1"/>
-          </a:fillRef>
-          <a:effectRef idx="0">
-            <a:schemeClr val="accent1"/>
-          </a:effectRef>
-          <a:fontRef idx="minor">
-            <a:schemeClr val="lt1"/>
-          </a:fontRef>
-        </p:style>
-        <p:txBody>
-          <a:bodyPr rot="0" spcFirstLastPara="0" vertOverflow="overflow" horzOverflow="overflow" vert="horz" wrap="square" lIns="91440" tIns="45720" rIns="91440" bIns="45720" numCol="1" spcCol="0" rtlCol="0" fromWordArt="0" anchor="ctr" anchorCtr="0" forceAA="0" compatLnSpc="1">
-            <a:prstTxWarp prst="textNoShape">
-              <a:avLst/>
-            </a:prstTxWarp>
-            <a:noAutofit/>
-          </a:bodyPr>
-          <a:lstStyle/>
-          <a:p>
-            <a:pPr algn="ctr"/>
-            <a:endParaRPr lang="pt-BR" sz="2072"/>
-          </a:p>
-        </p:txBody>
-      </p:sp>
       <p:sp>
         <p:nvSpPr>
           <p:cNvPr id="57" name="Losango 56"/>
@@ -5082,7 +4935,7 @@
   <a:extraClrSchemeLst/>
   <a:extLst>
     <a:ext uri="{05A4C25C-085E-4340-85A3-A5531E510DB2}">
-      <thm15:themeFamily xmlns:thm15="http://schemas.microsoft.com/office/thememl/2012/main" name="Office Theme" id="{62F939B6-93AF-4DB8-9C6B-D6C7DFDC589F}" vid="{4A3C46E8-61CC-4603-A589-7422A47A8E4A}"/>
+      <thm15:themeFamily xmlns:thm15="http://schemas.microsoft.com/office/thememl/2012/main" xmlns="" name="Office Theme" id="{62F939B6-93AF-4DB8-9C6B-D6C7DFDC589F}" vid="{4A3C46E8-61CC-4603-A589-7422A47A8E4A}"/>
     </a:ext>
   </a:extLst>
 </a:theme>

</xml_diff>